<commit_message>
Modification des personnas suite a la soutenance du mardi 12 mars
</commit_message>
<xml_diff>
--- a/personna_scenario/personnas.pptx
+++ b/personna_scenario/personnas.pptx
@@ -108,6 +108,11 @@
       </a:defRPr>
     </a:lvl9pPr>
   </p:defaultTextStyle>
+  <p:extLst>
+    <p:ext uri="{EFAFB233-063F-42B5-8137-9DF3F51BA10A}">
+      <p15:sldGuideLst xmlns:p15="http://schemas.microsoft.com/office/powerpoint/2012/main"/>
+    </p:ext>
+  </p:extLst>
 </p:presentation>
 </file>
 
@@ -193,7 +198,7 @@
           <a:p>
             <a:fld id="{6248EE26-D2EC-4A83-8359-4144F787F114}" type="datetimeFigureOut">
               <a:rPr lang="fr-FR" smtClean="0"/>
-              <a:t>11/03/2019</a:t>
+              <a:t>15/03/2019</a:t>
             </a:fld>
             <a:endParaRPr lang="fr-FR"/>
           </a:p>
@@ -680,7 +685,7 @@
           <a:p>
             <a:fld id="{046F2F55-58C1-46D0-86CA-DC60BF0775EE}" type="datetimeFigureOut">
               <a:rPr lang="fr-FR" smtClean="0"/>
-              <a:t>11/03/2019</a:t>
+              <a:t>15/03/2019</a:t>
             </a:fld>
             <a:endParaRPr lang="fr-FR"/>
           </a:p>
@@ -850,7 +855,7 @@
           <a:p>
             <a:fld id="{046F2F55-58C1-46D0-86CA-DC60BF0775EE}" type="datetimeFigureOut">
               <a:rPr lang="fr-FR" smtClean="0"/>
-              <a:t>11/03/2019</a:t>
+              <a:t>15/03/2019</a:t>
             </a:fld>
             <a:endParaRPr lang="fr-FR"/>
           </a:p>
@@ -1030,7 +1035,7 @@
           <a:p>
             <a:fld id="{046F2F55-58C1-46D0-86CA-DC60BF0775EE}" type="datetimeFigureOut">
               <a:rPr lang="fr-FR" smtClean="0"/>
-              <a:t>11/03/2019</a:t>
+              <a:t>15/03/2019</a:t>
             </a:fld>
             <a:endParaRPr lang="fr-FR"/>
           </a:p>
@@ -1200,7 +1205,7 @@
           <a:p>
             <a:fld id="{046F2F55-58C1-46D0-86CA-DC60BF0775EE}" type="datetimeFigureOut">
               <a:rPr lang="fr-FR" smtClean="0"/>
-              <a:t>11/03/2019</a:t>
+              <a:t>15/03/2019</a:t>
             </a:fld>
             <a:endParaRPr lang="fr-FR"/>
           </a:p>
@@ -1446,7 +1451,7 @@
           <a:p>
             <a:fld id="{046F2F55-58C1-46D0-86CA-DC60BF0775EE}" type="datetimeFigureOut">
               <a:rPr lang="fr-FR" smtClean="0"/>
-              <a:t>11/03/2019</a:t>
+              <a:t>15/03/2019</a:t>
             </a:fld>
             <a:endParaRPr lang="fr-FR"/>
           </a:p>
@@ -1678,7 +1683,7 @@
           <a:p>
             <a:fld id="{046F2F55-58C1-46D0-86CA-DC60BF0775EE}" type="datetimeFigureOut">
               <a:rPr lang="fr-FR" smtClean="0"/>
-              <a:t>11/03/2019</a:t>
+              <a:t>15/03/2019</a:t>
             </a:fld>
             <a:endParaRPr lang="fr-FR"/>
           </a:p>
@@ -2045,7 +2050,7 @@
           <a:p>
             <a:fld id="{046F2F55-58C1-46D0-86CA-DC60BF0775EE}" type="datetimeFigureOut">
               <a:rPr lang="fr-FR" smtClean="0"/>
-              <a:t>11/03/2019</a:t>
+              <a:t>15/03/2019</a:t>
             </a:fld>
             <a:endParaRPr lang="fr-FR"/>
           </a:p>
@@ -2163,7 +2168,7 @@
           <a:p>
             <a:fld id="{046F2F55-58C1-46D0-86CA-DC60BF0775EE}" type="datetimeFigureOut">
               <a:rPr lang="fr-FR" smtClean="0"/>
-              <a:t>11/03/2019</a:t>
+              <a:t>15/03/2019</a:t>
             </a:fld>
             <a:endParaRPr lang="fr-FR"/>
           </a:p>
@@ -2258,7 +2263,7 @@
           <a:p>
             <a:fld id="{046F2F55-58C1-46D0-86CA-DC60BF0775EE}" type="datetimeFigureOut">
               <a:rPr lang="fr-FR" smtClean="0"/>
-              <a:t>11/03/2019</a:t>
+              <a:t>15/03/2019</a:t>
             </a:fld>
             <a:endParaRPr lang="fr-FR"/>
           </a:p>
@@ -2535,7 +2540,7 @@
           <a:p>
             <a:fld id="{046F2F55-58C1-46D0-86CA-DC60BF0775EE}" type="datetimeFigureOut">
               <a:rPr lang="fr-FR" smtClean="0"/>
-              <a:t>11/03/2019</a:t>
+              <a:t>15/03/2019</a:t>
             </a:fld>
             <a:endParaRPr lang="fr-FR"/>
           </a:p>
@@ -2792,7 +2797,7 @@
           <a:p>
             <a:fld id="{046F2F55-58C1-46D0-86CA-DC60BF0775EE}" type="datetimeFigureOut">
               <a:rPr lang="fr-FR" smtClean="0"/>
-              <a:t>11/03/2019</a:t>
+              <a:t>15/03/2019</a:t>
             </a:fld>
             <a:endParaRPr lang="fr-FR"/>
           </a:p>
@@ -3005,7 +3010,7 @@
           <a:p>
             <a:fld id="{046F2F55-58C1-46D0-86CA-DC60BF0775EE}" type="datetimeFigureOut">
               <a:rPr lang="fr-FR" smtClean="0"/>
-              <a:t>11/03/2019</a:t>
+              <a:t>15/03/2019</a:t>
             </a:fld>
             <a:endParaRPr lang="fr-FR"/>
           </a:p>
@@ -3625,7 +3630,7 @@
         <p:spPr>
           <a:xfrm>
             <a:off x="3668041" y="1241147"/>
-            <a:ext cx="4311039" cy="3693319"/>
+            <a:ext cx="4311039" cy="3139321"/>
           </a:xfrm>
           <a:prstGeom prst="rect">
             <a:avLst/>
@@ -3640,23 +3645,32 @@
           <a:p>
             <a:r>
               <a:rPr lang="fr-FR" dirty="0"/>
-              <a:t>Il cherche un stage de fin d'étude</a:t>
+              <a:t>Besoins : </a:t>
             </a:r>
           </a:p>
           <a:p>
             <a:r>
               <a:rPr lang="fr-FR" dirty="0"/>
-              <a:t>Aime partir à l'étranger mais a un peu peur et a besoin de se faire rassurer. </a:t>
-            </a:r>
+              <a:t>	- Trouver un stage à l’étranger de fin d’étude en Thaïlande.</a:t>
+            </a:r>
+          </a:p>
+          <a:p>
+            <a:endParaRPr lang="fr-FR" dirty="0"/>
           </a:p>
           <a:p>
             <a:r>
               <a:rPr lang="fr-FR" dirty="0"/>
-              <a:t>Il aime l'Asie. Il cherche un stage dans le secteur du Backend. Il voudrait une entreprise où il y a déjà des étudiants de PNS ou où des étudiants sont déjà allés. Il voudrait savoir si l'entreprise pourrait l'embaucher par la suite. Il voudrait savoir il y a des logements proposé par l'entreprise ou si des étudiants cherchent des colocataires. </a:t>
+              <a:t>	- Il aimerait un stage dans le secteur du Backend.</a:t>
             </a:r>
           </a:p>
           <a:p>
             <a:endParaRPr lang="fr-FR" dirty="0"/>
+          </a:p>
+          <a:p>
+            <a:r>
+              <a:rPr lang="fr-FR" dirty="0"/>
+              <a:t>	- Savoir quels sont les étudiants qui sont déjà partis dans une entreprise, avoir leurs témoignages ainsi que pouvoir les contacter. </a:t>
+            </a:r>
           </a:p>
         </p:txBody>
       </p:sp>
@@ -3710,8 +3724,8 @@
         </p:nvSpPr>
         <p:spPr>
           <a:xfrm>
-            <a:off x="9344417" y="470101"/>
-            <a:ext cx="2563167" cy="769441"/>
+            <a:off x="9177180" y="370311"/>
+            <a:ext cx="2563167" cy="1077218"/>
           </a:xfrm>
           <a:prstGeom prst="rect">
             <a:avLst/>
@@ -3724,9 +3738,10 @@
           </a:bodyPr>
           <a:lstStyle/>
           <a:p>
-            <a:r>
-              <a:rPr lang="fr-FR" sz="4400" dirty="0"/>
-              <a:t>BUTS CLES</a:t>
+            <a:pPr algn="ctr"/>
+            <a:r>
+              <a:rPr lang="fr-FR" sz="3200" dirty="0"/>
+              <a:t>Points importants</a:t>
             </a:r>
           </a:p>
         </p:txBody>
@@ -3765,7 +3780,7 @@
             </a:pPr>
             <a:r>
               <a:rPr lang="fr-FR" dirty="0"/>
-              <a:t>Sait ou il veut partir</a:t>
+              <a:t>Sait dans quel pays il veut partir</a:t>
             </a:r>
           </a:p>
           <a:p>
@@ -3778,7 +3793,7 @@
             </a:pPr>
             <a:r>
               <a:rPr lang="fr-FR" dirty="0"/>
-              <a:t>Sait dans quel secteur il fau faire son stage</a:t>
+              <a:t>Sait dans quel secteur il veut faire son stage</a:t>
             </a:r>
           </a:p>
           <a:p>
@@ -3791,7 +3806,7 @@
             </a:pPr>
             <a:r>
               <a:rPr lang="fr-FR" dirty="0"/>
-              <a:t>Connaitre opportunités d’embauche</a:t>
+              <a:t>Connaitre les opportunités d’embauche</a:t>
             </a:r>
           </a:p>
           <a:p>
@@ -4085,7 +4100,7 @@
         <p:spPr>
           <a:xfrm>
             <a:off x="3668041" y="1241147"/>
-            <a:ext cx="4311039" cy="3139321"/>
+            <a:ext cx="4311039" cy="3416320"/>
           </a:xfrm>
           <a:prstGeom prst="rect">
             <a:avLst/>
@@ -4100,17 +4115,35 @@
           <a:p>
             <a:r>
               <a:rPr lang="fr-FR" dirty="0"/>
-              <a:t>Il cherche un stage de fin d'étude</a:t>
-            </a:r>
+              <a:t>Besoins :</a:t>
+            </a:r>
+          </a:p>
+          <a:p>
+            <a:endParaRPr lang="fr-FR" dirty="0"/>
           </a:p>
           <a:p>
             <a:r>
               <a:rPr lang="fr-FR" dirty="0"/>
-              <a:t>Aime partir à l'étranger mais ne sais pas encore dans quel pays partir. Pour choisir il aimerait avoir des informations sur les différent pays (culture, démarche visa, prix de vie). Ne sachant pas dans quel pays il veut partir il aimerait pouvoir trouver un entreprise en fonction de ses envies (secteur d’activité, taille de l’entreprise, continent…) sans avoir a spécifier un pays.</a:t>
+              <a:t>	- Trouver un stage à l’étranger de fin d’étude adapté a sa spécialité. </a:t>
             </a:r>
           </a:p>
           <a:p>
             <a:endParaRPr lang="fr-FR" dirty="0"/>
+          </a:p>
+          <a:p>
+            <a:r>
+              <a:rPr lang="fr-FR" dirty="0"/>
+              <a:t>	- Il aimerait avoir des informations sur les différent pays (culture, démarche visa, prix de vie</a:t>
+            </a:r>
+          </a:p>
+          <a:p>
+            <a:endParaRPr lang="fr-FR" dirty="0"/>
+          </a:p>
+          <a:p>
+            <a:r>
+              <a:rPr lang="fr-FR" dirty="0"/>
+              <a:t>	- Pouvoir trouver un stage grâce a une recherche a l’aide de différents (secteur d’activité, taille de l’entreprise, continent…)</a:t>
+            </a:r>
           </a:p>
         </p:txBody>
       </p:sp>
@@ -4152,41 +4185,6 @@
       </p:pic>
       <p:sp>
         <p:nvSpPr>
-          <p:cNvPr id="17" name="ZoneTexte 16">
-            <a:extLst>
-              <a:ext uri="{FF2B5EF4-FFF2-40B4-BE49-F238E27FC236}">
-                <a16:creationId xmlns:a16="http://schemas.microsoft.com/office/drawing/2014/main" id="{D051022A-5E1D-4D74-8A0D-902DB1DAB4EB}"/>
-              </a:ext>
-            </a:extLst>
-          </p:cNvPr>
-          <p:cNvSpPr txBox="1"/>
-          <p:nvPr/>
-        </p:nvSpPr>
-        <p:spPr>
-          <a:xfrm>
-            <a:off x="9344417" y="470101"/>
-            <a:ext cx="2563167" cy="769441"/>
-          </a:xfrm>
-          <a:prstGeom prst="rect">
-            <a:avLst/>
-          </a:prstGeom>
-          <a:noFill/>
-        </p:spPr>
-        <p:txBody>
-          <a:bodyPr wrap="square" rtlCol="0">
-            <a:spAutoFit/>
-          </a:bodyPr>
-          <a:lstStyle/>
-          <a:p>
-            <a:r>
-              <a:rPr lang="fr-FR" sz="4400" dirty="0"/>
-              <a:t>BUTS CLES</a:t>
-            </a:r>
-          </a:p>
-        </p:txBody>
-      </p:sp>
-      <p:sp>
-        <p:nvSpPr>
           <p:cNvPr id="18" name="ZoneTexte 17">
             <a:extLst>
               <a:ext uri="{FF2B5EF4-FFF2-40B4-BE49-F238E27FC236}">
@@ -4279,6 +4277,42 @@
               <a:buChar char="-"/>
             </a:pPr>
             <a:endParaRPr lang="fr-FR" dirty="0"/>
+          </a:p>
+        </p:txBody>
+      </p:sp>
+      <p:sp>
+        <p:nvSpPr>
+          <p:cNvPr id="12" name="ZoneTexte 11">
+            <a:extLst>
+              <a:ext uri="{FF2B5EF4-FFF2-40B4-BE49-F238E27FC236}">
+                <a16:creationId xmlns:a16="http://schemas.microsoft.com/office/drawing/2014/main" id="{274F1864-DC6C-42F7-973B-7844870E6A59}"/>
+              </a:ext>
+            </a:extLst>
+          </p:cNvPr>
+          <p:cNvSpPr txBox="1"/>
+          <p:nvPr/>
+        </p:nvSpPr>
+        <p:spPr>
+          <a:xfrm>
+            <a:off x="9177180" y="370311"/>
+            <a:ext cx="2563167" cy="1077218"/>
+          </a:xfrm>
+          <a:prstGeom prst="rect">
+            <a:avLst/>
+          </a:prstGeom>
+          <a:noFill/>
+        </p:spPr>
+        <p:txBody>
+          <a:bodyPr wrap="square" rtlCol="0">
+            <a:spAutoFit/>
+          </a:bodyPr>
+          <a:lstStyle/>
+          <a:p>
+            <a:pPr algn="ctr"/>
+            <a:r>
+              <a:rPr lang="fr-FR" sz="3200" dirty="0"/>
+              <a:t>Points importants</a:t>
+            </a:r>
           </a:p>
         </p:txBody>
       </p:sp>

</xml_diff>